<commit_message>
more typo / structure improvements
</commit_message>
<xml_diff>
--- a/Thesis/figures/CPU_microarchitecture.pptx
+++ b/Thesis/figures/CPU_microarchitecture.pptx
@@ -243,7 +243,7 @@
           <a:p>
             <a:fld id="{F61BA98C-8A77-405A-A2C8-0FD5028D8365}" type="datetimeFigureOut">
               <a:rPr lang="en-US" smtClean="0"/>
-              <a:t>8/12/2022</a:t>
+              <a:t>8/21/2022</a:t>
             </a:fld>
             <a:endParaRPr lang="en-US"/>
           </a:p>
@@ -413,7 +413,7 @@
           <a:p>
             <a:fld id="{F61BA98C-8A77-405A-A2C8-0FD5028D8365}" type="datetimeFigureOut">
               <a:rPr lang="en-US" smtClean="0"/>
-              <a:t>8/12/2022</a:t>
+              <a:t>8/21/2022</a:t>
             </a:fld>
             <a:endParaRPr lang="en-US"/>
           </a:p>
@@ -593,7 +593,7 @@
           <a:p>
             <a:fld id="{F61BA98C-8A77-405A-A2C8-0FD5028D8365}" type="datetimeFigureOut">
               <a:rPr lang="en-US" smtClean="0"/>
-              <a:t>8/12/2022</a:t>
+              <a:t>8/21/2022</a:t>
             </a:fld>
             <a:endParaRPr lang="en-US"/>
           </a:p>
@@ -763,7 +763,7 @@
           <a:p>
             <a:fld id="{F61BA98C-8A77-405A-A2C8-0FD5028D8365}" type="datetimeFigureOut">
               <a:rPr lang="en-US" smtClean="0"/>
-              <a:t>8/12/2022</a:t>
+              <a:t>8/21/2022</a:t>
             </a:fld>
             <a:endParaRPr lang="en-US"/>
           </a:p>
@@ -1007,7 +1007,7 @@
           <a:p>
             <a:fld id="{F61BA98C-8A77-405A-A2C8-0FD5028D8365}" type="datetimeFigureOut">
               <a:rPr lang="en-US" smtClean="0"/>
-              <a:t>8/12/2022</a:t>
+              <a:t>8/21/2022</a:t>
             </a:fld>
             <a:endParaRPr lang="en-US"/>
           </a:p>
@@ -1239,7 +1239,7 @@
           <a:p>
             <a:fld id="{F61BA98C-8A77-405A-A2C8-0FD5028D8365}" type="datetimeFigureOut">
               <a:rPr lang="en-US" smtClean="0"/>
-              <a:t>8/12/2022</a:t>
+              <a:t>8/21/2022</a:t>
             </a:fld>
             <a:endParaRPr lang="en-US"/>
           </a:p>
@@ -1606,7 +1606,7 @@
           <a:p>
             <a:fld id="{F61BA98C-8A77-405A-A2C8-0FD5028D8365}" type="datetimeFigureOut">
               <a:rPr lang="en-US" smtClean="0"/>
-              <a:t>8/12/2022</a:t>
+              <a:t>8/21/2022</a:t>
             </a:fld>
             <a:endParaRPr lang="en-US"/>
           </a:p>
@@ -1724,7 +1724,7 @@
           <a:p>
             <a:fld id="{F61BA98C-8A77-405A-A2C8-0FD5028D8365}" type="datetimeFigureOut">
               <a:rPr lang="en-US" smtClean="0"/>
-              <a:t>8/12/2022</a:t>
+              <a:t>8/21/2022</a:t>
             </a:fld>
             <a:endParaRPr lang="en-US"/>
           </a:p>
@@ -1819,7 +1819,7 @@
           <a:p>
             <a:fld id="{F61BA98C-8A77-405A-A2C8-0FD5028D8365}" type="datetimeFigureOut">
               <a:rPr lang="en-US" smtClean="0"/>
-              <a:t>8/12/2022</a:t>
+              <a:t>8/21/2022</a:t>
             </a:fld>
             <a:endParaRPr lang="en-US"/>
           </a:p>
@@ -2096,7 +2096,7 @@
           <a:p>
             <a:fld id="{F61BA98C-8A77-405A-A2C8-0FD5028D8365}" type="datetimeFigureOut">
               <a:rPr lang="en-US" smtClean="0"/>
-              <a:t>8/12/2022</a:t>
+              <a:t>8/21/2022</a:t>
             </a:fld>
             <a:endParaRPr lang="en-US"/>
           </a:p>
@@ -2353,7 +2353,7 @@
           <a:p>
             <a:fld id="{F61BA98C-8A77-405A-A2C8-0FD5028D8365}" type="datetimeFigureOut">
               <a:rPr lang="en-US" smtClean="0"/>
-              <a:t>8/12/2022</a:t>
+              <a:t>8/21/2022</a:t>
             </a:fld>
             <a:endParaRPr lang="en-US"/>
           </a:p>
@@ -2566,7 +2566,7 @@
           <a:p>
             <a:fld id="{F61BA98C-8A77-405A-A2C8-0FD5028D8365}" type="datetimeFigureOut">
               <a:rPr lang="en-US" smtClean="0"/>
-              <a:t>8/12/2022</a:t>
+              <a:t>8/21/2022</a:t>
             </a:fld>
             <a:endParaRPr lang="en-US"/>
           </a:p>
@@ -6071,7 +6071,7 @@
             </a:solidFill>
             <a:prstDash val="solid"/>
             <a:round/>
-            <a:headEnd type="none" w="med" len="med"/>
+            <a:headEnd type="arrow" w="med" len="med"/>
             <a:tailEnd type="arrow" w="med" len="med"/>
           </a:ln>
         </p:spPr>

</xml_diff>